<commit_message>
<LAPR4-184> resolução de alguns bugs e adição de classes
</commit_message>
<xml_diff>
--- a/Docs/Sprint B/Apresentação SprintB.pptx
+++ b/Docs/Sprint B/Apresentação SprintB.pptx
@@ -205,7 +205,7 @@
           <a:p>
             <a:fld id="{B2A57C7C-E022-4BBE-96D5-C9F9D81A6DBB}" type="datetimeFigureOut">
               <a:rPr lang="pt-PT" smtClean="0"/>
-              <a:t>09/05/2021</a:t>
+              <a:t>10/05/2021</a:t>
             </a:fld>
             <a:endParaRPr lang="pt-PT"/>
           </a:p>
@@ -831,7 +831,7 @@
           <a:p>
             <a:fld id="{9B87E8FF-8BD5-44C4-A338-D3A6E7F93349}" type="datetime1">
               <a:rPr lang="pt-PT" smtClean="0"/>
-              <a:t>09/05/2021</a:t>
+              <a:t>10/05/2021</a:t>
             </a:fld>
             <a:endParaRPr lang="pt-PT"/>
           </a:p>
@@ -1267,7 +1267,7 @@
           <a:p>
             <a:fld id="{9EA9C444-DF2D-449B-A8CB-F98103EB48AB}" type="datetime1">
               <a:rPr lang="pt-PT" smtClean="0"/>
-              <a:t>09/05/2021</a:t>
+              <a:t>10/05/2021</a:t>
             </a:fld>
             <a:endParaRPr lang="pt-PT"/>
           </a:p>
@@ -1517,7 +1517,7 @@
           <a:p>
             <a:fld id="{E76B7669-FB89-4479-B47E-7752AF196F2F}" type="datetime1">
               <a:rPr lang="pt-PT" smtClean="0"/>
-              <a:t>09/05/2021</a:t>
+              <a:t>10/05/2021</a:t>
             </a:fld>
             <a:endParaRPr lang="pt-PT"/>
           </a:p>
@@ -1825,7 +1825,7 @@
           <a:p>
             <a:fld id="{E7DF2E6B-41C1-40FE-87D5-1FDAB1EA3076}" type="datetime1">
               <a:rPr lang="pt-PT" smtClean="0"/>
-              <a:t>09/05/2021</a:t>
+              <a:t>10/05/2021</a:t>
             </a:fld>
             <a:endParaRPr lang="pt-PT"/>
           </a:p>
@@ -2143,7 +2143,7 @@
           <a:p>
             <a:fld id="{4081B567-385A-4004-88D3-20DEF503772B}" type="datetime1">
               <a:rPr lang="pt-PT" smtClean="0"/>
-              <a:t>09/05/2021</a:t>
+              <a:t>10/05/2021</a:t>
             </a:fld>
             <a:endParaRPr lang="pt-PT"/>
           </a:p>
@@ -2445,7 +2445,7 @@
           <a:p>
             <a:fld id="{6E864343-1BBF-4E6C-A7DD-05C237628452}" type="datetime1">
               <a:rPr lang="pt-PT" smtClean="0"/>
-              <a:t>09/05/2021</a:t>
+              <a:t>10/05/2021</a:t>
             </a:fld>
             <a:endParaRPr lang="pt-PT"/>
           </a:p>
@@ -2812,7 +2812,7 @@
           <a:p>
             <a:fld id="{1F5B9BD3-7A91-4AF8-9E1D-766FBC05A04D}" type="datetime1">
               <a:rPr lang="pt-PT" smtClean="0"/>
-              <a:t>09/05/2021</a:t>
+              <a:t>10/05/2021</a:t>
             </a:fld>
             <a:endParaRPr lang="pt-PT"/>
           </a:p>
@@ -2986,7 +2986,7 @@
           <a:p>
             <a:fld id="{5F4A885E-39C5-4D0E-A6C1-3DE289DB2866}" type="datetime1">
               <a:rPr lang="pt-PT" smtClean="0"/>
-              <a:t>09/05/2021</a:t>
+              <a:t>10/05/2021</a:t>
             </a:fld>
             <a:endParaRPr lang="pt-PT"/>
           </a:p>
@@ -3166,7 +3166,7 @@
           <a:p>
             <a:fld id="{90471F2A-92EA-4F63-9342-F2315FC420B8}" type="datetime1">
               <a:rPr lang="pt-PT" smtClean="0"/>
-              <a:t>09/05/2021</a:t>
+              <a:t>10/05/2021</a:t>
             </a:fld>
             <a:endParaRPr lang="pt-PT"/>
           </a:p>
@@ -3336,7 +3336,7 @@
           <a:p>
             <a:fld id="{3441F5DB-D4E1-4017-BD92-9450B921E179}" type="datetime1">
               <a:rPr lang="pt-PT" smtClean="0"/>
-              <a:t>09/05/2021</a:t>
+              <a:t>10/05/2021</a:t>
             </a:fld>
             <a:endParaRPr lang="pt-PT"/>
           </a:p>
@@ -3586,7 +3586,7 @@
           <a:p>
             <a:fld id="{9A4517EE-E46F-4F4E-9171-2EEE157B2706}" type="datetime1">
               <a:rPr lang="pt-PT" smtClean="0"/>
-              <a:t>09/05/2021</a:t>
+              <a:t>10/05/2021</a:t>
             </a:fld>
             <a:endParaRPr lang="pt-PT"/>
           </a:p>
@@ -3822,7 +3822,7 @@
           <a:p>
             <a:fld id="{25246EF0-3D1E-4332-90AA-6BB4440D2735}" type="datetime1">
               <a:rPr lang="pt-PT" smtClean="0"/>
-              <a:t>09/05/2021</a:t>
+              <a:t>10/05/2021</a:t>
             </a:fld>
             <a:endParaRPr lang="pt-PT"/>
           </a:p>
@@ -4204,7 +4204,7 @@
           <a:p>
             <a:fld id="{B7F30659-4BAA-4134-AB78-98202C1C7CE6}" type="datetime1">
               <a:rPr lang="pt-PT" smtClean="0"/>
-              <a:t>09/05/2021</a:t>
+              <a:t>10/05/2021</a:t>
             </a:fld>
             <a:endParaRPr lang="pt-PT"/>
           </a:p>
@@ -4322,7 +4322,7 @@
           <a:p>
             <a:fld id="{7DE690A0-8499-40E1-8730-574A3908A83C}" type="datetime1">
               <a:rPr lang="pt-PT" smtClean="0"/>
-              <a:t>09/05/2021</a:t>
+              <a:t>10/05/2021</a:t>
             </a:fld>
             <a:endParaRPr lang="pt-PT"/>
           </a:p>
@@ -4417,7 +4417,7 @@
           <a:p>
             <a:fld id="{0F8E8205-08F3-4BCC-A691-346E95BBCFDE}" type="datetime1">
               <a:rPr lang="pt-PT" smtClean="0"/>
-              <a:t>09/05/2021</a:t>
+              <a:t>10/05/2021</a:t>
             </a:fld>
             <a:endParaRPr lang="pt-PT"/>
           </a:p>
@@ -4672,7 +4672,7 @@
           <a:p>
             <a:fld id="{88AD57B1-AF68-442C-A36F-1FDEB942D534}" type="datetime1">
               <a:rPr lang="pt-PT" smtClean="0"/>
-              <a:t>09/05/2021</a:t>
+              <a:t>10/05/2021</a:t>
             </a:fld>
             <a:endParaRPr lang="pt-PT"/>
           </a:p>
@@ -4955,7 +4955,7 @@
           <a:p>
             <a:fld id="{C9F0345A-A4B2-456B-824A-43D232C9E737}" type="datetime1">
               <a:rPr lang="pt-PT" smtClean="0"/>
-              <a:t>09/05/2021</a:t>
+              <a:t>10/05/2021</a:t>
             </a:fld>
             <a:endParaRPr lang="pt-PT"/>
           </a:p>
@@ -5361,7 +5361,7 @@
           <a:p>
             <a:fld id="{79E4A434-5FE5-4C23-99E0-10CE270C8475}" type="datetime1">
               <a:rPr lang="pt-PT" smtClean="0"/>
-              <a:t>09/05/2021</a:t>
+              <a:t>10/05/2021</a:t>
             </a:fld>
             <a:endParaRPr lang="pt-PT"/>
           </a:p>
@@ -5946,6 +5946,14 @@
               </a:rPr>
               <a:t>4º SEMESTRE DA LEI-ISEP</a:t>
             </a:r>
+            <a:r>
+              <a:rPr lang="pt-PT" b="1" dirty="0">
+                <a:solidFill>
+                  <a:srgbClr val="B13C19"/>
+                </a:solidFill>
+              </a:rPr>
+              <a:t/>
+            </a:r>
             <a:br>
               <a:rPr lang="pt-PT" b="1" dirty="0">
                 <a:solidFill>
@@ -6208,6 +6216,13 @@
   <p:clrMapOvr>
     <a:masterClrMapping/>
   </p:clrMapOvr>
+  <p:timing>
+    <p:tnLst>
+      <p:par>
+        <p:cTn id="1" dur="indefinite" restart="never" nodeType="tmRoot"/>
+      </p:par>
+    </p:tnLst>
+  </p:timing>
 </p:sld>
 </file>
 
@@ -6425,6 +6440,13 @@
   <p:clrMapOvr>
     <a:masterClrMapping/>
   </p:clrMapOvr>
+  <p:timing>
+    <p:tnLst>
+      <p:par>
+        <p:cTn id="1" dur="indefinite" restart="never" nodeType="tmRoot"/>
+      </p:par>
+    </p:tnLst>
+  </p:timing>
 </p:sld>
 </file>
 
@@ -6695,6 +6717,13 @@
   <p:clrMapOvr>
     <a:masterClrMapping/>
   </p:clrMapOvr>
+  <p:timing>
+    <p:tnLst>
+      <p:par>
+        <p:cTn id="1" dur="indefinite" restart="never" nodeType="tmRoot"/>
+      </p:par>
+    </p:tnLst>
+  </p:timing>
 </p:sld>
 </file>
 
@@ -7001,6 +7030,13 @@
   <p:clrMapOvr>
     <a:masterClrMapping/>
   </p:clrMapOvr>
+  <p:timing>
+    <p:tnLst>
+      <p:par>
+        <p:cTn id="1" dur="indefinite" restart="never" nodeType="tmRoot"/>
+      </p:par>
+    </p:tnLst>
+  </p:timing>
 </p:sld>
 </file>
 
@@ -7252,6 +7288,13 @@
   <p:clrMapOvr>
     <a:masterClrMapping/>
   </p:clrMapOvr>
+  <p:timing>
+    <p:tnLst>
+      <p:par>
+        <p:cTn id="1" dur="indefinite" restart="never" nodeType="tmRoot"/>
+      </p:par>
+    </p:tnLst>
+  </p:timing>
 </p:sld>
 </file>
 
@@ -7506,6 +7549,13 @@
   <p:clrMapOvr>
     <a:masterClrMapping/>
   </p:clrMapOvr>
+  <p:timing>
+    <p:tnLst>
+      <p:par>
+        <p:cTn id="1" dur="indefinite" restart="never" nodeType="tmRoot"/>
+      </p:par>
+    </p:tnLst>
+  </p:timing>
 </p:sld>
 </file>
 
@@ -7572,7 +7622,7 @@
                 <a16:creationId xmlns:a16="http://schemas.microsoft.com/office/drawing/2014/main" id="{E7F66E32-26C2-4D17-86D2-12CCD3071489}"/>
               </a:ext>
               <a:ext uri="{C183D7F6-B498-43B3-948B-1728B52AA6E4}">
-                <adec:decorative xmlns:adec="http://schemas.microsoft.com/office/drawing/2017/decorative" val="0"/>
+                <adec:decorative xmlns:adec="http://schemas.microsoft.com/office/drawing/2017/decorative" xmlns="" val="0"/>
               </a:ext>
             </a:extLst>
           </p:cNvPr>
@@ -7728,6 +7778,13 @@
   <p:clrMapOvr>
     <a:masterClrMapping/>
   </p:clrMapOvr>
+  <p:timing>
+    <p:tnLst>
+      <p:par>
+        <p:cTn id="1" dur="indefinite" restart="never" nodeType="tmRoot"/>
+      </p:par>
+    </p:tnLst>
+  </p:timing>
 </p:sld>
 </file>
 
@@ -7800,7 +7857,7 @@
         <p:spPr>
           <a:xfrm>
             <a:off x="480060" y="1645920"/>
-            <a:ext cx="9634611" cy="2031325"/>
+            <a:ext cx="9634611" cy="2308324"/>
           </a:xfrm>
           <a:prstGeom prst="rect">
             <a:avLst/>
@@ -7820,8 +7877,20 @@
             </a:pPr>
             <a:r>
               <a:rPr lang="pt-PT" dirty="0"/>
-              <a:t>Após a realização deste Sprint, retiramos as seguintes conclusões:</a:t>
-            </a:r>
+              <a:t>Após a realização deste Sprint, retiramos as seguintes conclusões</a:t>
+            </a:r>
+            <a:r>
+              <a:rPr lang="pt-PT" dirty="0" smtClean="0"/>
+              <a:t>:</a:t>
+            </a:r>
+          </a:p>
+          <a:p>
+            <a:pPr>
+              <a:buClr>
+                <a:srgbClr val="B13C19"/>
+              </a:buClr>
+            </a:pPr>
+            <a:endParaRPr lang="pt-PT" dirty="0"/>
           </a:p>
           <a:p>
             <a:pPr marL="285750" indent="-285750">
@@ -7832,8 +7901,12 @@
               <a:buChar char="•"/>
             </a:pPr>
             <a:r>
+              <a:rPr lang="pt-PT" dirty="0" smtClean="0"/>
+              <a:t>Planeamento </a:t>
+            </a:r>
+            <a:r>
               <a:rPr lang="pt-PT" dirty="0"/>
-              <a:t> Planeamento prévio e uma boa gestão são fulcrais;</a:t>
+              <a:t>prévio e uma boa gestão são fulcrais;</a:t>
             </a:r>
           </a:p>
           <a:p>
@@ -7924,6 +7997,13 @@
   <p:clrMapOvr>
     <a:masterClrMapping/>
   </p:clrMapOvr>
+  <p:timing>
+    <p:tnLst>
+      <p:par>
+        <p:cTn id="1" dur="indefinite" restart="never" nodeType="tmRoot"/>
+      </p:par>
+    </p:tnLst>
+  </p:timing>
 </p:sld>
 </file>
 
@@ -7992,6 +8072,14 @@
                 </a:solidFill>
               </a:rPr>
               <a:t>4º SEMESTRE DA LEI-ISEP</a:t>
+            </a:r>
+            <a:r>
+              <a:rPr lang="pt-PT" b="1" dirty="0">
+                <a:solidFill>
+                  <a:srgbClr val="B13C19"/>
+                </a:solidFill>
+              </a:rPr>
+              <a:t/>
             </a:r>
             <a:br>
               <a:rPr lang="pt-PT" b="1" dirty="0">
@@ -8154,6 +8242,13 @@
   <p:clrMapOvr>
     <a:masterClrMapping/>
   </p:clrMapOvr>
+  <p:timing>
+    <p:tnLst>
+      <p:par>
+        <p:cTn id="1" dur="indefinite" restart="never" nodeType="tmRoot"/>
+      </p:par>
+    </p:tnLst>
+  </p:timing>
 </p:sld>
 </file>
 

</xml_diff>